<commit_message>
Frage-Folien dupliziert ohne antwort
</commit_message>
<xml_diff>
--- a/Recap/ToroRecap.pptx
+++ b/Recap/ToroRecap.pptx
@@ -19,11 +19,13 @@
     <p:sldId id="260" r:id="rId13"/>
     <p:sldId id="261" r:id="rId14"/>
     <p:sldId id="275" r:id="rId15"/>
-    <p:sldId id="276" r:id="rId16"/>
-    <p:sldId id="266" r:id="rId17"/>
-    <p:sldId id="265" r:id="rId18"/>
-    <p:sldId id="262" r:id="rId19"/>
-    <p:sldId id="263" r:id="rId20"/>
+    <p:sldId id="277" r:id="rId16"/>
+    <p:sldId id="276" r:id="rId17"/>
+    <p:sldId id="278" r:id="rId18"/>
+    <p:sldId id="266" r:id="rId19"/>
+    <p:sldId id="265" r:id="rId20"/>
+    <p:sldId id="262" r:id="rId21"/>
+    <p:sldId id="263" r:id="rId22"/>
   </p:sldIdLst>
   <p:sldSz cx="9144000" cy="6858000" type="screen4x3"/>
   <p:notesSz cx="6858000" cy="9144000"/>
@@ -124,7 +126,7 @@
   </p:defaultTextStyle>
   <p:extLst>
     <p:ext uri="{EFAFB233-063F-42B5-8137-9DF3F51BA10A}">
-      <p15:sldGuideLst xmlns:p15="http://schemas.microsoft.com/office/powerpoint/2012/main">
+      <p15:sldGuideLst xmlns:p15="http://schemas.microsoft.com/office/powerpoint/2012/main" xmlns="">
         <p15:guide id="1" orient="horz" pos="2160">
           <p15:clr>
             <a:srgbClr val="A4A3A4"/>
@@ -329,7 +331,7 @@
           <a:p>
             <a:fld id="{C8A432C8-69A7-458B-9684-2BFA64B31948}" type="datetime2">
               <a:rPr lang="en-US" smtClean="0"/>
-              <a:t>Wednesday, November 9, 2016</a:t>
+              <a:t>Mittwoch, 9. November 16</a:t>
             </a:fld>
             <a:endParaRPr lang="en-US"/>
           </a:p>
@@ -529,7 +531,7 @@
           <a:p>
             <a:fld id="{8CC057FC-95B6-4D89-AFDA-ABA33EE921E5}" type="datetime2">
               <a:rPr lang="en-US" smtClean="0"/>
-              <a:t>Wednesday, November 9, 2016</a:t>
+              <a:t>Mittwoch, 9. November 16</a:t>
             </a:fld>
             <a:endParaRPr lang="en-US"/>
           </a:p>
@@ -706,7 +708,7 @@
           <a:p>
             <a:fld id="{EC4549AC-EB31-477F-92A9-B1988E232878}" type="datetime2">
               <a:rPr lang="en-US" smtClean="0"/>
-              <a:t>Wednesday, November 9, 2016</a:t>
+              <a:t>Mittwoch, 9. November 16</a:t>
             </a:fld>
             <a:endParaRPr lang="en-US"/>
           </a:p>
@@ -871,7 +873,7 @@
           <a:p>
             <a:fld id="{6396A3A3-94A6-4E5B-AF39-173ACA3E61CC}" type="datetime2">
               <a:rPr lang="en-US" smtClean="0"/>
-              <a:t>Wednesday, November 9, 2016</a:t>
+              <a:t>Mittwoch, 9. November 16</a:t>
             </a:fld>
             <a:endParaRPr lang="en-US"/>
           </a:p>
@@ -1121,7 +1123,7 @@
           <a:p>
             <a:fld id="{9933D019-A32C-4EAD-B8E6-DBDA699692FD}" type="datetime2">
               <a:rPr lang="en-US" smtClean="0"/>
-              <a:t>Wednesday, November 9, 2016</a:t>
+              <a:t>Mittwoch, 9. November 16</a:t>
             </a:fld>
             <a:endParaRPr lang="en-US"/>
           </a:p>
@@ -1440,7 +1442,7 @@
           <a:p>
             <a:fld id="{CCEBA98F-560C-4997-81C4-81D4D9187EAB}" type="datetime2">
               <a:rPr lang="en-US" smtClean="0"/>
-              <a:t>Wednesday, November 9, 2016</a:t>
+              <a:t>Mittwoch, 9. November 16</a:t>
             </a:fld>
             <a:endParaRPr lang="en-US"/>
           </a:p>
@@ -1908,7 +1910,7 @@
           <a:p>
             <a:fld id="{150972B2-CA5C-437D-87D0-8081271A9E4B}" type="datetime2">
               <a:rPr lang="en-US" smtClean="0"/>
-              <a:t>Wednesday, November 9, 2016</a:t>
+              <a:t>Mittwoch, 9. November 16</a:t>
             </a:fld>
             <a:endParaRPr lang="en-US"/>
           </a:p>
@@ -2057,7 +2059,7 @@
           <a:p>
             <a:fld id="{79CD4847-11EF-4466-A8AD-85CDB7B49118}" type="datetime2">
               <a:rPr lang="en-US" smtClean="0"/>
-              <a:t>Wednesday, November 9, 2016</a:t>
+              <a:t>Mittwoch, 9. November 16</a:t>
             </a:fld>
             <a:endParaRPr lang="en-US"/>
           </a:p>
@@ -2149,7 +2151,7 @@
           <a:p>
             <a:fld id="{F168457A-3AB9-4880-8A0C-9F8524491207}" type="datetime2">
               <a:rPr lang="en-US" smtClean="0"/>
-              <a:t>Wednesday, November 9, 2016</a:t>
+              <a:t>Mittwoch, 9. November 16</a:t>
             </a:fld>
             <a:endParaRPr lang="en-US"/>
           </a:p>
@@ -2425,7 +2427,7 @@
           <a:p>
             <a:fld id="{3FE976D3-5B7F-4300-ABED-C91F1B2AE209}" type="datetime2">
               <a:rPr lang="en-US" smtClean="0"/>
-              <a:t>Wednesday, November 9, 2016</a:t>
+              <a:t>Mittwoch, 9. November 16</a:t>
             </a:fld>
             <a:endParaRPr lang="en-US"/>
           </a:p>
@@ -2732,7 +2734,7 @@
           <a:p>
             <a:fld id="{EBDC1E59-17DD-41CE-97CA-624A472382D4}" type="datetime2">
               <a:rPr lang="en-US" smtClean="0"/>
-              <a:t>Wednesday, November 9, 2016</a:t>
+              <a:t>Mittwoch, 9. November 16</a:t>
             </a:fld>
             <a:endParaRPr lang="en-US"/>
           </a:p>
@@ -3031,7 +3033,7 @@
           <a:p>
             <a:fld id="{A80CB818-7379-467D-8E76-EF9D9074A26C}" type="datetime2">
               <a:rPr lang="en-US" smtClean="0"/>
-              <a:t>Wednesday, November 9, 2016</a:t>
+              <a:t>Mittwoch, 9. November 16</a:t>
             </a:fld>
             <a:endParaRPr lang="en-US" dirty="0"/>
           </a:p>
@@ -3966,79 +3968,6 @@
             <a:endParaRPr lang="en-US" dirty="0"/>
           </a:p>
           <a:p>
-            <a:endParaRPr lang="en-US" dirty="0"/>
-          </a:p>
-          <a:p>
-            <a:r>
-              <a:rPr lang="en-US" dirty="0"/>
-              <a:t>A: </a:t>
-            </a:r>
-            <a:r>
-              <a:rPr lang="en-US" dirty="0" err="1"/>
-              <a:t>Zur</a:t>
-            </a:r>
-            <a:r>
-              <a:rPr lang="en-US" dirty="0"/>
-              <a:t> </a:t>
-            </a:r>
-            <a:r>
-              <a:rPr lang="en-US" dirty="0" err="1"/>
-              <a:t>Kompilierzeit</a:t>
-            </a:r>
-            <a:r>
-              <a:rPr lang="en-US" dirty="0"/>
-              <a:t>. </a:t>
-            </a:r>
-            <a:r>
-              <a:rPr lang="en-US" dirty="0" err="1"/>
-              <a:t>Kann</a:t>
-            </a:r>
-            <a:r>
-              <a:rPr lang="en-US" dirty="0"/>
-              <a:t> </a:t>
-            </a:r>
-            <a:r>
-              <a:rPr lang="en-US" dirty="0" err="1"/>
-              <a:t>während</a:t>
-            </a:r>
-            <a:r>
-              <a:rPr lang="en-US" dirty="0"/>
-              <a:t> </a:t>
-            </a:r>
-            <a:r>
-              <a:rPr lang="en-US" dirty="0" err="1"/>
-              <a:t>Laufzeit</a:t>
-            </a:r>
-            <a:r>
-              <a:rPr lang="en-US" dirty="0"/>
-              <a:t> </a:t>
-            </a:r>
-            <a:r>
-              <a:rPr lang="en-US" dirty="0" err="1"/>
-              <a:t>nicht</a:t>
-            </a:r>
-            <a:r>
-              <a:rPr lang="en-US" dirty="0"/>
-              <a:t> </a:t>
-            </a:r>
-            <a:r>
-              <a:rPr lang="en-US" dirty="0" err="1"/>
-              <a:t>verändert</a:t>
-            </a:r>
-            <a:r>
-              <a:rPr lang="en-US" dirty="0"/>
-              <a:t> </a:t>
-            </a:r>
-            <a:r>
-              <a:rPr lang="en-US" dirty="0" err="1"/>
-              <a:t>werden</a:t>
-            </a:r>
-            <a:r>
-              <a:rPr lang="en-US" dirty="0"/>
-              <a:t>.</a:t>
-            </a:r>
-          </a:p>
-          <a:p>
             <a:pPr marL="274320" lvl="1" indent="0">
               <a:buNone/>
             </a:pPr>
@@ -4065,7 +3994,202 @@
   <p:timing>
     <p:tnLst>
       <p:par>
-        <p:cTn id="1" dur="indefinite" restart="never" nodeType="tmRoot">
+        <p:cTn xmlns:p14="http://schemas.microsoft.com/office/powerpoint/2010/main" id="1" dur="indefinite" restart="never" nodeType="tmRoot"/>
+      </p:par>
+    </p:tnLst>
+  </p:timing>
+</p:sld>
+</file>
+
+<file path=ppt/slides/slide15.xml><?xml version="1.0" encoding="utf-8"?>
+<p:sld xmlns:a="http://schemas.openxmlformats.org/drawingml/2006/main" xmlns:r="http://schemas.openxmlformats.org/officeDocument/2006/relationships" xmlns:p="http://schemas.openxmlformats.org/presentationml/2006/main">
+  <p:cSld>
+    <p:spTree>
+      <p:nvGrpSpPr>
+        <p:cNvPr id="1" name=""/>
+        <p:cNvGrpSpPr/>
+        <p:nvPr/>
+      </p:nvGrpSpPr>
+      <p:grpSpPr>
+        <a:xfrm>
+          <a:off x="0" y="0"/>
+          <a:ext cx="0" cy="0"/>
+          <a:chOff x="0" y="0"/>
+          <a:chExt cx="0" cy="0"/>
+        </a:xfrm>
+      </p:grpSpPr>
+      <p:sp>
+        <p:nvSpPr>
+          <p:cNvPr id="2" name="Titel 1"/>
+          <p:cNvSpPr>
+            <a:spLocks noGrp="1"/>
+          </p:cNvSpPr>
+          <p:nvPr>
+            <p:ph type="title"/>
+          </p:nvPr>
+        </p:nvSpPr>
+        <p:spPr/>
+        <p:txBody>
+          <a:bodyPr/>
+          <a:lstStyle/>
+          <a:p>
+            <a:r>
+              <a:rPr lang="en-US" dirty="0"/>
+              <a:t>Quiz Queue</a:t>
+            </a:r>
+          </a:p>
+        </p:txBody>
+      </p:sp>
+      <p:sp>
+        <p:nvSpPr>
+          <p:cNvPr id="3" name="Inhaltsplatzhalter 2"/>
+          <p:cNvSpPr>
+            <a:spLocks noGrp="1"/>
+          </p:cNvSpPr>
+          <p:nvPr>
+            <p:ph idx="1"/>
+          </p:nvPr>
+        </p:nvSpPr>
+        <p:spPr/>
+        <p:txBody>
+          <a:bodyPr>
+            <a:normAutofit/>
+          </a:bodyPr>
+          <a:lstStyle/>
+          <a:p>
+            <a:r>
+              <a:rPr lang="en-US" dirty="0"/>
+              <a:t>Q: </a:t>
+            </a:r>
+            <a:r>
+              <a:rPr lang="en-US" dirty="0" err="1"/>
+              <a:t>Wann</a:t>
+            </a:r>
+            <a:r>
+              <a:rPr lang="en-US" dirty="0"/>
+              <a:t> muss die </a:t>
+            </a:r>
+            <a:r>
+              <a:rPr lang="en-US" dirty="0" err="1"/>
+              <a:t>Grösse</a:t>
+            </a:r>
+            <a:r>
+              <a:rPr lang="en-US" dirty="0"/>
+              <a:t> der Queue </a:t>
+            </a:r>
+            <a:r>
+              <a:rPr lang="en-US" dirty="0" err="1"/>
+              <a:t>bekannt</a:t>
+            </a:r>
+            <a:r>
+              <a:rPr lang="en-US" dirty="0"/>
+              <a:t> sein?</a:t>
+            </a:r>
+          </a:p>
+          <a:p>
+            <a:endParaRPr lang="en-US" dirty="0"/>
+          </a:p>
+          <a:p>
+            <a:endParaRPr lang="en-US" dirty="0"/>
+          </a:p>
+          <a:p>
+            <a:r>
+              <a:rPr lang="en-US" dirty="0"/>
+              <a:t>A: </a:t>
+            </a:r>
+            <a:r>
+              <a:rPr lang="en-US" dirty="0" err="1"/>
+              <a:t>Zur</a:t>
+            </a:r>
+            <a:r>
+              <a:rPr lang="en-US" dirty="0"/>
+              <a:t> </a:t>
+            </a:r>
+            <a:r>
+              <a:rPr lang="en-US" dirty="0" err="1"/>
+              <a:t>Kompilierzeit</a:t>
+            </a:r>
+            <a:r>
+              <a:rPr lang="en-US" dirty="0"/>
+              <a:t>. </a:t>
+            </a:r>
+            <a:r>
+              <a:rPr lang="en-US" dirty="0" err="1"/>
+              <a:t>Kann</a:t>
+            </a:r>
+            <a:r>
+              <a:rPr lang="en-US" dirty="0"/>
+              <a:t> </a:t>
+            </a:r>
+            <a:r>
+              <a:rPr lang="en-US" dirty="0" err="1"/>
+              <a:t>während</a:t>
+            </a:r>
+            <a:r>
+              <a:rPr lang="en-US" dirty="0"/>
+              <a:t> </a:t>
+            </a:r>
+            <a:r>
+              <a:rPr lang="en-US" dirty="0" err="1"/>
+              <a:t>Laufzeit</a:t>
+            </a:r>
+            <a:r>
+              <a:rPr lang="en-US" dirty="0"/>
+              <a:t> </a:t>
+            </a:r>
+            <a:r>
+              <a:rPr lang="en-US" dirty="0" err="1"/>
+              <a:t>nicht</a:t>
+            </a:r>
+            <a:r>
+              <a:rPr lang="en-US" dirty="0"/>
+              <a:t> </a:t>
+            </a:r>
+            <a:r>
+              <a:rPr lang="en-US" dirty="0" err="1"/>
+              <a:t>verändert</a:t>
+            </a:r>
+            <a:r>
+              <a:rPr lang="en-US" dirty="0"/>
+              <a:t> </a:t>
+            </a:r>
+            <a:r>
+              <a:rPr lang="en-US" dirty="0" err="1"/>
+              <a:t>werden</a:t>
+            </a:r>
+            <a:r>
+              <a:rPr lang="en-US" dirty="0"/>
+              <a:t>.</a:t>
+            </a:r>
+          </a:p>
+          <a:p>
+            <a:pPr marL="274320" lvl="1" indent="0">
+              <a:buNone/>
+            </a:pPr>
+            <a:endParaRPr lang="en-US" dirty="0"/>
+          </a:p>
+          <a:p>
+            <a:pPr marL="274320" lvl="1" indent="0">
+              <a:buNone/>
+            </a:pPr>
+            <a:endParaRPr lang="en-US" dirty="0"/>
+          </a:p>
+        </p:txBody>
+      </p:sp>
+    </p:spTree>
+    <p:extLst>
+      <p:ext uri="{BB962C8B-B14F-4D97-AF65-F5344CB8AC3E}">
+        <p14:creationId xmlns:p14="http://schemas.microsoft.com/office/powerpoint/2010/main" val="1122517047"/>
+      </p:ext>
+    </p:extLst>
+  </p:cSld>
+  <p:clrMapOvr>
+    <a:masterClrMapping/>
+  </p:clrMapOvr>
+  <p:timing>
+    <p:tnLst>
+      <p:par>
+        <p:cTn xmlns:p14="http://schemas.microsoft.com/office/powerpoint/2010/main" id="1" dur="indefinite" restart="never" nodeType="tmRoot">
           <p:childTnLst>
             <p:seq concurrent="1" nextAc="seek">
               <p:cTn id="2" dur="indefinite" nodeType="mainSeq">
@@ -4141,13 +4265,13 @@
       </p:par>
     </p:tnLst>
     <p:bldLst>
-      <p:bldP spid="3" grpId="0" uiExpand="1" build="p"/>
+      <p:bldP spid="3" grpId="0" build="p"/>
     </p:bldLst>
   </p:timing>
 </p:sld>
 </file>
 
-<file path=ppt/slides/slide15.xml><?xml version="1.0" encoding="utf-8"?>
+<file path=ppt/slides/slide16.xml><?xml version="1.0" encoding="utf-8"?>
 <p:sld xmlns:a="http://schemas.openxmlformats.org/drawingml/2006/main" xmlns:r="http://schemas.openxmlformats.org/officeDocument/2006/relationships" xmlns:p="http://schemas.openxmlformats.org/presentationml/2006/main">
   <p:cSld>
     <p:spTree>
@@ -4244,63 +4368,6 @@
             <a:endParaRPr lang="en-US" dirty="0"/>
           </a:p>
           <a:p>
-            <a:endParaRPr lang="en-US" dirty="0"/>
-          </a:p>
-          <a:p>
-            <a:r>
-              <a:rPr lang="en-US" dirty="0"/>
-              <a:t>A: Callbacks in FRTOS, die </a:t>
-            </a:r>
-            <a:r>
-              <a:rPr lang="en-US" dirty="0" err="1"/>
-              <a:t>bei</a:t>
-            </a:r>
-            <a:r>
-              <a:rPr lang="en-US" dirty="0"/>
-              <a:t> </a:t>
-            </a:r>
-            <a:r>
-              <a:rPr lang="en-US" dirty="0" err="1"/>
-              <a:t>Ereignisse</a:t>
-            </a:r>
-            <a:r>
-              <a:rPr lang="en-US" dirty="0"/>
-              <a:t> (</a:t>
-            </a:r>
-            <a:r>
-              <a:rPr lang="en-US" dirty="0" err="1"/>
-              <a:t>bsp</a:t>
-            </a:r>
-            <a:r>
-              <a:rPr lang="en-US" dirty="0"/>
-              <a:t>. </a:t>
-            </a:r>
-            <a:r>
-              <a:rPr lang="en-US" dirty="0" err="1"/>
-              <a:t>StackOF</a:t>
-            </a:r>
-            <a:r>
-              <a:rPr lang="en-US" dirty="0"/>
-              <a:t>) </a:t>
-            </a:r>
-            <a:r>
-              <a:rPr lang="en-US" dirty="0" err="1"/>
-              <a:t>aufgerufen</a:t>
-            </a:r>
-            <a:r>
-              <a:rPr lang="en-US" dirty="0"/>
-              <a:t> </a:t>
-            </a:r>
-            <a:r>
-              <a:rPr lang="en-US" dirty="0" err="1"/>
-              <a:t>werden</a:t>
-            </a:r>
-            <a:r>
-              <a:rPr lang="en-US" dirty="0"/>
-              <a:t>. 4 Hooks.</a:t>
-            </a:r>
-          </a:p>
-          <a:p>
             <a:pPr marL="274320" lvl="1" indent="0">
               <a:buNone/>
             </a:pPr>
@@ -4327,7 +4394,194 @@
   <p:timing>
     <p:tnLst>
       <p:par>
-        <p:cTn id="1" dur="indefinite" restart="never" nodeType="tmRoot">
+        <p:cTn xmlns:p14="http://schemas.microsoft.com/office/powerpoint/2010/main" id="1" dur="indefinite" restart="never" nodeType="tmRoot"/>
+      </p:par>
+    </p:tnLst>
+  </p:timing>
+</p:sld>
+</file>
+
+<file path=ppt/slides/slide17.xml><?xml version="1.0" encoding="utf-8"?>
+<p:sld xmlns:a="http://schemas.openxmlformats.org/drawingml/2006/main" xmlns:r="http://schemas.openxmlformats.org/officeDocument/2006/relationships" xmlns:p="http://schemas.openxmlformats.org/presentationml/2006/main">
+  <p:cSld>
+    <p:spTree>
+      <p:nvGrpSpPr>
+        <p:cNvPr id="1" name=""/>
+        <p:cNvGrpSpPr/>
+        <p:nvPr/>
+      </p:nvGrpSpPr>
+      <p:grpSpPr>
+        <a:xfrm>
+          <a:off x="0" y="0"/>
+          <a:ext cx="0" cy="0"/>
+          <a:chOff x="0" y="0"/>
+          <a:chExt cx="0" cy="0"/>
+        </a:xfrm>
+      </p:grpSpPr>
+      <p:sp>
+        <p:nvSpPr>
+          <p:cNvPr id="2" name="Titel 1"/>
+          <p:cNvSpPr>
+            <a:spLocks noGrp="1"/>
+          </p:cNvSpPr>
+          <p:nvPr>
+            <p:ph type="title"/>
+          </p:nvPr>
+        </p:nvSpPr>
+        <p:spPr/>
+        <p:txBody>
+          <a:bodyPr/>
+          <a:lstStyle/>
+          <a:p>
+            <a:r>
+              <a:rPr lang="en-US" dirty="0"/>
+              <a:t>Quiz Hook</a:t>
+            </a:r>
+          </a:p>
+        </p:txBody>
+      </p:sp>
+      <p:sp>
+        <p:nvSpPr>
+          <p:cNvPr id="3" name="Inhaltsplatzhalter 2"/>
+          <p:cNvSpPr>
+            <a:spLocks noGrp="1"/>
+          </p:cNvSpPr>
+          <p:nvPr>
+            <p:ph idx="1"/>
+          </p:nvPr>
+        </p:nvSpPr>
+        <p:spPr/>
+        <p:txBody>
+          <a:bodyPr>
+            <a:normAutofit/>
+          </a:bodyPr>
+          <a:lstStyle/>
+          <a:p>
+            <a:r>
+              <a:rPr lang="en-US" dirty="0"/>
+              <a:t>Q: Was </a:t>
+            </a:r>
+            <a:r>
+              <a:rPr lang="en-US" dirty="0" err="1"/>
+              <a:t>sind</a:t>
+            </a:r>
+            <a:r>
+              <a:rPr lang="en-US" dirty="0"/>
+              <a:t> Hooks? Und </a:t>
+            </a:r>
+            <a:r>
+              <a:rPr lang="en-US" dirty="0" err="1"/>
+              <a:t>wieviele</a:t>
+            </a:r>
+            <a:r>
+              <a:rPr lang="en-US" dirty="0"/>
+              <a:t> </a:t>
+            </a:r>
+            <a:r>
+              <a:rPr lang="en-US" dirty="0" err="1"/>
+              <a:t>gibt</a:t>
+            </a:r>
+            <a:r>
+              <a:rPr lang="en-US" dirty="0"/>
+              <a:t> </a:t>
+            </a:r>
+            <a:r>
+              <a:rPr lang="en-US" dirty="0" err="1"/>
+              <a:t>es</a:t>
+            </a:r>
+            <a:r>
+              <a:rPr lang="en-US" dirty="0"/>
+              <a:t>?</a:t>
+            </a:r>
+          </a:p>
+          <a:p>
+            <a:endParaRPr lang="en-US" dirty="0"/>
+          </a:p>
+          <a:p>
+            <a:endParaRPr lang="en-US" dirty="0"/>
+          </a:p>
+          <a:p>
+            <a:r>
+              <a:rPr lang="en-US" dirty="0"/>
+              <a:t>A: Callbacks in FRTOS, die </a:t>
+            </a:r>
+            <a:r>
+              <a:rPr lang="en-US" dirty="0" err="1"/>
+              <a:t>bei</a:t>
+            </a:r>
+            <a:r>
+              <a:rPr lang="en-US" dirty="0"/>
+              <a:t> </a:t>
+            </a:r>
+            <a:r>
+              <a:rPr lang="en-US" dirty="0" err="1"/>
+              <a:t>Ereignisse</a:t>
+            </a:r>
+            <a:r>
+              <a:rPr lang="en-US" dirty="0"/>
+              <a:t> (</a:t>
+            </a:r>
+            <a:r>
+              <a:rPr lang="en-US" dirty="0" err="1"/>
+              <a:t>bsp</a:t>
+            </a:r>
+            <a:r>
+              <a:rPr lang="en-US" dirty="0"/>
+              <a:t>. </a:t>
+            </a:r>
+            <a:r>
+              <a:rPr lang="en-US" dirty="0" err="1"/>
+              <a:t>StackOF</a:t>
+            </a:r>
+            <a:r>
+              <a:rPr lang="en-US" dirty="0"/>
+              <a:t>) </a:t>
+            </a:r>
+            <a:r>
+              <a:rPr lang="en-US" dirty="0" err="1"/>
+              <a:t>aufgerufen</a:t>
+            </a:r>
+            <a:r>
+              <a:rPr lang="en-US" dirty="0"/>
+              <a:t> </a:t>
+            </a:r>
+            <a:r>
+              <a:rPr lang="en-US" dirty="0" err="1"/>
+              <a:t>werden</a:t>
+            </a:r>
+            <a:r>
+              <a:rPr lang="en-US" dirty="0"/>
+              <a:t>. 4 Hooks.</a:t>
+            </a:r>
+          </a:p>
+          <a:p>
+            <a:pPr marL="274320" lvl="1" indent="0">
+              <a:buNone/>
+            </a:pPr>
+            <a:endParaRPr lang="en-US" dirty="0"/>
+          </a:p>
+          <a:p>
+            <a:pPr marL="274320" lvl="1" indent="0">
+              <a:buNone/>
+            </a:pPr>
+            <a:endParaRPr lang="en-US" dirty="0"/>
+          </a:p>
+        </p:txBody>
+      </p:sp>
+    </p:spTree>
+    <p:extLst>
+      <p:ext uri="{BB962C8B-B14F-4D97-AF65-F5344CB8AC3E}">
+        <p14:creationId xmlns:p14="http://schemas.microsoft.com/office/powerpoint/2010/main" val="1147584356"/>
+      </p:ext>
+    </p:extLst>
+  </p:cSld>
+  <p:clrMapOvr>
+    <a:masterClrMapping/>
+  </p:clrMapOvr>
+  <p:timing>
+    <p:tnLst>
+      <p:par>
+        <p:cTn xmlns:p14="http://schemas.microsoft.com/office/powerpoint/2010/main" id="1" dur="indefinite" restart="never" nodeType="tmRoot">
           <p:childTnLst>
             <p:seq concurrent="1" nextAc="seek">
               <p:cTn id="2" dur="indefinite" nodeType="mainSeq">
@@ -4406,591 +4660,6 @@
 </p:sld>
 </file>
 
-<file path=ppt/slides/slide16.xml><?xml version="1.0" encoding="utf-8"?>
-<p:sld xmlns:a="http://schemas.openxmlformats.org/drawingml/2006/main" xmlns:r="http://schemas.openxmlformats.org/officeDocument/2006/relationships" xmlns:p="http://schemas.openxmlformats.org/presentationml/2006/main">
-  <p:cSld>
-    <p:spTree>
-      <p:nvGrpSpPr>
-        <p:cNvPr id="1" name=""/>
-        <p:cNvGrpSpPr/>
-        <p:nvPr/>
-      </p:nvGrpSpPr>
-      <p:grpSpPr>
-        <a:xfrm>
-          <a:off x="0" y="0"/>
-          <a:ext cx="0" cy="0"/>
-          <a:chOff x="0" y="0"/>
-          <a:chExt cx="0" cy="0"/>
-        </a:xfrm>
-      </p:grpSpPr>
-      <p:sp>
-        <p:nvSpPr>
-          <p:cNvPr id="2" name="Titel 1"/>
-          <p:cNvSpPr>
-            <a:spLocks noGrp="1"/>
-          </p:cNvSpPr>
-          <p:nvPr>
-            <p:ph type="title"/>
-          </p:nvPr>
-        </p:nvSpPr>
-        <p:spPr/>
-        <p:txBody>
-          <a:bodyPr/>
-          <a:lstStyle/>
-          <a:p>
-            <a:r>
-              <a:rPr lang="en-US" dirty="0"/>
-              <a:t>Quiz Shell</a:t>
-            </a:r>
-          </a:p>
-        </p:txBody>
-      </p:sp>
-      <p:sp>
-        <p:nvSpPr>
-          <p:cNvPr id="3" name="Inhaltsplatzhalter 2"/>
-          <p:cNvSpPr>
-            <a:spLocks noGrp="1"/>
-          </p:cNvSpPr>
-          <p:nvPr>
-            <p:ph idx="1"/>
-          </p:nvPr>
-        </p:nvSpPr>
-        <p:spPr/>
-        <p:txBody>
-          <a:bodyPr>
-            <a:normAutofit lnSpcReduction="10000"/>
-          </a:bodyPr>
-          <a:lstStyle/>
-          <a:p>
-            <a:r>
-              <a:rPr lang="en-US" dirty="0"/>
-              <a:t>Q:</a:t>
-            </a:r>
-          </a:p>
-          <a:p>
-            <a:pPr marL="274320" lvl="1" indent="0">
-              <a:buNone/>
-            </a:pPr>
-            <a:r>
-              <a:rPr lang="en-US" dirty="0" err="1"/>
-              <a:t>Obwohl</a:t>
-            </a:r>
-            <a:r>
-              <a:rPr lang="en-US" dirty="0"/>
-              <a:t> Hillary </a:t>
-            </a:r>
-            <a:r>
-              <a:rPr lang="en-US" dirty="0" err="1"/>
-              <a:t>sonst</a:t>
-            </a:r>
-            <a:r>
-              <a:rPr lang="en-US" dirty="0"/>
-              <a:t> </a:t>
-            </a:r>
-            <a:r>
-              <a:rPr lang="en-US" dirty="0" err="1"/>
-              <a:t>nicht</a:t>
-            </a:r>
-            <a:r>
-              <a:rPr lang="en-US" dirty="0"/>
-              <a:t> </a:t>
-            </a:r>
-            <a:r>
-              <a:rPr lang="en-US" dirty="0" err="1"/>
-              <a:t>sehr</a:t>
-            </a:r>
-            <a:r>
-              <a:rPr lang="en-US" dirty="0"/>
-              <a:t> IT-</a:t>
-            </a:r>
-            <a:r>
-              <a:rPr lang="en-US" dirty="0" err="1"/>
-              <a:t>begabt</a:t>
-            </a:r>
-            <a:r>
-              <a:rPr lang="en-US" dirty="0"/>
-              <a:t> </a:t>
-            </a:r>
-            <a:r>
-              <a:rPr lang="en-US" dirty="0" err="1"/>
-              <a:t>ist</a:t>
-            </a:r>
-            <a:r>
-              <a:rPr lang="en-US" dirty="0"/>
-              <a:t>, hat </a:t>
-            </a:r>
-            <a:r>
-              <a:rPr lang="en-US" dirty="0" err="1"/>
-              <a:t>sie</a:t>
-            </a:r>
-            <a:r>
-              <a:rPr lang="en-US" dirty="0"/>
-              <a:t> </a:t>
-            </a:r>
-            <a:r>
-              <a:rPr lang="en-US" dirty="0" err="1"/>
-              <a:t>es</a:t>
-            </a:r>
-            <a:r>
-              <a:rPr lang="en-US" dirty="0"/>
-              <a:t> </a:t>
-            </a:r>
-            <a:r>
-              <a:rPr lang="en-US" dirty="0" err="1"/>
-              <a:t>geschafft</a:t>
-            </a:r>
-            <a:r>
-              <a:rPr lang="en-US" dirty="0"/>
-              <a:t> </a:t>
-            </a:r>
-            <a:r>
-              <a:rPr lang="en-US" dirty="0" err="1"/>
-              <a:t>ihren</a:t>
-            </a:r>
-            <a:r>
-              <a:rPr lang="en-US" dirty="0"/>
-              <a:t> Shell-Parser so </a:t>
-            </a:r>
-            <a:r>
-              <a:rPr lang="en-US" dirty="0" err="1"/>
-              <a:t>zu</a:t>
-            </a:r>
-            <a:r>
-              <a:rPr lang="en-US" dirty="0"/>
-              <a:t> </a:t>
-            </a:r>
-            <a:r>
-              <a:rPr lang="en-US" dirty="0" err="1"/>
-              <a:t>erweitern</a:t>
-            </a:r>
-            <a:r>
-              <a:rPr lang="en-US" dirty="0"/>
-              <a:t>, </a:t>
-            </a:r>
-            <a:r>
-              <a:rPr lang="en-US" dirty="0" err="1"/>
-              <a:t>dass</a:t>
-            </a:r>
-            <a:r>
-              <a:rPr lang="en-US" dirty="0"/>
-              <a:t> die </a:t>
-            </a:r>
-            <a:r>
-              <a:rPr lang="en-US" dirty="0" err="1"/>
-              <a:t>Eingabe</a:t>
-            </a:r>
-            <a:r>
-              <a:rPr lang="en-US" dirty="0"/>
-              <a:t> von “result” </a:t>
-            </a:r>
-            <a:r>
-              <a:rPr lang="en-US" dirty="0" err="1"/>
-              <a:t>zur</a:t>
-            </a:r>
-            <a:r>
-              <a:rPr lang="en-US" dirty="0"/>
-              <a:t> </a:t>
-            </a:r>
-            <a:r>
-              <a:rPr lang="en-US" dirty="0" err="1"/>
-              <a:t>Ausgabe</a:t>
-            </a:r>
-            <a:r>
-              <a:rPr lang="en-US" dirty="0"/>
-              <a:t> des Strings “VICTORY!!” </a:t>
-            </a:r>
-            <a:r>
-              <a:rPr lang="en-US" dirty="0" err="1"/>
-              <a:t>führt</a:t>
-            </a:r>
-            <a:r>
-              <a:rPr lang="en-US" dirty="0"/>
-              <a:t>. Nun </a:t>
-            </a:r>
-            <a:r>
-              <a:rPr lang="en-US" dirty="0" err="1"/>
-              <a:t>möchte</a:t>
-            </a:r>
-            <a:r>
-              <a:rPr lang="en-US" dirty="0"/>
-              <a:t> </a:t>
-            </a:r>
-            <a:r>
-              <a:rPr lang="en-US" dirty="0" err="1"/>
-              <a:t>sie</a:t>
-            </a:r>
-            <a:r>
-              <a:rPr lang="en-US" dirty="0"/>
-              <a:t> die </a:t>
-            </a:r>
-            <a:r>
-              <a:rPr lang="en-US" dirty="0" err="1"/>
-              <a:t>Ausgabe</a:t>
-            </a:r>
-            <a:r>
-              <a:rPr lang="en-US" dirty="0"/>
-              <a:t> </a:t>
-            </a:r>
-            <a:r>
-              <a:rPr lang="en-US" dirty="0" err="1"/>
-              <a:t>als</a:t>
-            </a:r>
-            <a:r>
-              <a:rPr lang="en-US" dirty="0"/>
-              <a:t> </a:t>
-            </a:r>
-            <a:r>
-              <a:rPr lang="en-US" dirty="0" err="1"/>
-              <a:t>automatische</a:t>
-            </a:r>
-            <a:r>
-              <a:rPr lang="en-US" dirty="0"/>
-              <a:t> </a:t>
-            </a:r>
-            <a:r>
-              <a:rPr lang="en-US" dirty="0" err="1"/>
-              <a:t>Willkommensnachricht</a:t>
-            </a:r>
-            <a:r>
-              <a:rPr lang="en-US" dirty="0"/>
-              <a:t> </a:t>
-            </a:r>
-            <a:r>
-              <a:rPr lang="en-US" dirty="0" err="1"/>
-              <a:t>bei</a:t>
-            </a:r>
-            <a:r>
-              <a:rPr lang="en-US" dirty="0"/>
-              <a:t> </a:t>
-            </a:r>
-            <a:r>
-              <a:rPr lang="en-US" dirty="0" err="1"/>
-              <a:t>jedem</a:t>
-            </a:r>
-            <a:r>
-              <a:rPr lang="en-US" dirty="0"/>
-              <a:t> </a:t>
-            </a:r>
-            <a:r>
-              <a:rPr lang="en-US" dirty="0" err="1"/>
-              <a:t>Systemstart</a:t>
-            </a:r>
-            <a:r>
-              <a:rPr lang="en-US" dirty="0"/>
-              <a:t> </a:t>
-            </a:r>
-            <a:r>
-              <a:rPr lang="en-US" dirty="0" err="1"/>
-              <a:t>zu</a:t>
-            </a:r>
-            <a:r>
-              <a:rPr lang="en-US" dirty="0"/>
-              <a:t> </a:t>
-            </a:r>
-            <a:r>
-              <a:rPr lang="en-US" dirty="0" err="1"/>
-              <a:t>sehen</a:t>
-            </a:r>
-            <a:r>
-              <a:rPr lang="en-US" dirty="0"/>
-              <a:t> </a:t>
-            </a:r>
-            <a:r>
-              <a:rPr lang="en-US" dirty="0" err="1"/>
-              <a:t>bekommen</a:t>
-            </a:r>
-            <a:r>
-              <a:rPr lang="en-US" dirty="0"/>
-              <a:t>.</a:t>
-            </a:r>
-          </a:p>
-          <a:p>
-            <a:pPr marL="274320" lvl="1" indent="0">
-              <a:buNone/>
-            </a:pPr>
-            <a:r>
-              <a:rPr lang="en-US" dirty="0" err="1"/>
-              <a:t>Welche</a:t>
-            </a:r>
-            <a:r>
-              <a:rPr lang="en-US" dirty="0"/>
-              <a:t> der </a:t>
-            </a:r>
-            <a:r>
-              <a:rPr lang="en-US" dirty="0" err="1"/>
-              <a:t>beiden</a:t>
-            </a:r>
-            <a:r>
-              <a:rPr lang="en-US" dirty="0"/>
-              <a:t> </a:t>
-            </a:r>
-            <a:r>
-              <a:rPr lang="en-US" dirty="0" err="1"/>
-              <a:t>folgenden</a:t>
-            </a:r>
-            <a:r>
-              <a:rPr lang="en-US" dirty="0"/>
-              <a:t> </a:t>
-            </a:r>
-            <a:r>
-              <a:rPr lang="en-US" dirty="0" err="1"/>
-              <a:t>Funktionen</a:t>
-            </a:r>
-            <a:r>
-              <a:rPr lang="en-US" dirty="0"/>
-              <a:t> </a:t>
-            </a:r>
-            <a:r>
-              <a:rPr lang="en-US" dirty="0" err="1"/>
-              <a:t>setzt</a:t>
-            </a:r>
-            <a:r>
-              <a:rPr lang="en-US" dirty="0"/>
-              <a:t> </a:t>
-            </a:r>
-            <a:r>
-              <a:rPr lang="en-US" dirty="0" err="1"/>
-              <a:t>sie</a:t>
-            </a:r>
-            <a:r>
-              <a:rPr lang="en-US" dirty="0"/>
-              <a:t> </a:t>
-            </a:r>
-            <a:r>
-              <a:rPr lang="en-US" dirty="0" err="1"/>
-              <a:t>dafür</a:t>
-            </a:r>
-            <a:r>
-              <a:rPr lang="en-US" dirty="0"/>
-              <a:t> </a:t>
-            </a:r>
-            <a:r>
-              <a:rPr lang="en-US" dirty="0" err="1"/>
-              <a:t>im</a:t>
-            </a:r>
-            <a:r>
-              <a:rPr lang="en-US" dirty="0"/>
-              <a:t> </a:t>
-            </a:r>
-            <a:r>
-              <a:rPr lang="en-US" dirty="0" err="1"/>
-              <a:t>ShellTask</a:t>
-            </a:r>
-            <a:r>
-              <a:rPr lang="en-US" dirty="0"/>
-              <a:t> </a:t>
-            </a:r>
-            <a:r>
-              <a:rPr lang="en-US" dirty="0" err="1"/>
-              <a:t>ein</a:t>
-            </a:r>
-            <a:r>
-              <a:rPr lang="en-US" dirty="0"/>
-              <a:t> und </a:t>
-            </a:r>
-            <a:r>
-              <a:rPr lang="en-US" dirty="0" err="1"/>
-              <a:t>warum</a:t>
-            </a:r>
-            <a:r>
-              <a:rPr lang="en-US" dirty="0"/>
-              <a:t>?</a:t>
-            </a:r>
-          </a:p>
-          <a:p>
-            <a:pPr marL="274320" lvl="1" indent="0">
-              <a:buNone/>
-            </a:pPr>
-            <a:endParaRPr lang="en-US" dirty="0"/>
-          </a:p>
-          <a:p>
-            <a:pPr marL="274320" lvl="1" indent="0">
-              <a:buNone/>
-            </a:pPr>
-            <a:r>
-              <a:rPr lang="en-US" dirty="0"/>
-              <a:t>CLS1_ParseWithCommandTable()</a:t>
-            </a:r>
-          </a:p>
-          <a:p>
-            <a:pPr marL="274320" lvl="1" indent="0">
-              <a:buNone/>
-            </a:pPr>
-            <a:endParaRPr lang="en-US" dirty="0"/>
-          </a:p>
-          <a:p>
-            <a:pPr marL="274320" lvl="1" indent="0">
-              <a:buNone/>
-            </a:pPr>
-            <a:r>
-              <a:rPr lang="en-US" dirty="0"/>
-              <a:t>	</a:t>
-            </a:r>
-            <a:r>
-              <a:rPr lang="en-US" dirty="0" err="1"/>
-              <a:t>oder</a:t>
-            </a:r>
-            <a:endParaRPr lang="en-US" dirty="0"/>
-          </a:p>
-          <a:p>
-            <a:pPr marL="274320" lvl="1" indent="0">
-              <a:buNone/>
-            </a:pPr>
-            <a:endParaRPr lang="en-US" dirty="0"/>
-          </a:p>
-          <a:p>
-            <a:pPr marL="274320" lvl="1" indent="0">
-              <a:buNone/>
-            </a:pPr>
-            <a:r>
-              <a:rPr lang="en-US" dirty="0"/>
-              <a:t>CLS1_ReadAndParseWithCommandTable()</a:t>
-            </a:r>
-          </a:p>
-          <a:p>
-            <a:pPr marL="274320" lvl="1" indent="0">
-              <a:buNone/>
-            </a:pPr>
-            <a:endParaRPr lang="en-US" dirty="0"/>
-          </a:p>
-          <a:p>
-            <a:pPr marL="274320" lvl="1" indent="0">
-              <a:buNone/>
-            </a:pPr>
-            <a:endParaRPr lang="en-US" dirty="0"/>
-          </a:p>
-        </p:txBody>
-      </p:sp>
-    </p:spTree>
-    <p:extLst>
-      <p:ext uri="{BB962C8B-B14F-4D97-AF65-F5344CB8AC3E}">
-        <p14:creationId xmlns:p14="http://schemas.microsoft.com/office/powerpoint/2010/main" val="1890198303"/>
-      </p:ext>
-    </p:extLst>
-  </p:cSld>
-  <p:clrMapOvr>
-    <a:masterClrMapping/>
-  </p:clrMapOvr>
-</p:sld>
-</file>
-
-<file path=ppt/slides/slide17.xml><?xml version="1.0" encoding="utf-8"?>
-<p:sld xmlns:a="http://schemas.openxmlformats.org/drawingml/2006/main" xmlns:r="http://schemas.openxmlformats.org/officeDocument/2006/relationships" xmlns:p="http://schemas.openxmlformats.org/presentationml/2006/main">
-  <p:cSld>
-    <p:spTree>
-      <p:nvGrpSpPr>
-        <p:cNvPr id="1" name=""/>
-        <p:cNvGrpSpPr/>
-        <p:nvPr/>
-      </p:nvGrpSpPr>
-      <p:grpSpPr>
-        <a:xfrm>
-          <a:off x="0" y="0"/>
-          <a:ext cx="0" cy="0"/>
-          <a:chOff x="0" y="0"/>
-          <a:chExt cx="0" cy="0"/>
-        </a:xfrm>
-      </p:grpSpPr>
-      <p:sp>
-        <p:nvSpPr>
-          <p:cNvPr id="2" name="Titel 1"/>
-          <p:cNvSpPr>
-            <a:spLocks noGrp="1"/>
-          </p:cNvSpPr>
-          <p:nvPr>
-            <p:ph type="title"/>
-          </p:nvPr>
-        </p:nvSpPr>
-        <p:spPr/>
-        <p:txBody>
-          <a:bodyPr/>
-          <a:lstStyle/>
-          <a:p>
-            <a:r>
-              <a:rPr lang="en-US" dirty="0"/>
-              <a:t>Quiz Shell</a:t>
-            </a:r>
-            <a:endParaRPr lang="en-US" dirty="0"/>
-          </a:p>
-        </p:txBody>
-      </p:sp>
-      <p:sp>
-        <p:nvSpPr>
-          <p:cNvPr id="3" name="Inhaltsplatzhalter 2"/>
-          <p:cNvSpPr>
-            <a:spLocks noGrp="1"/>
-          </p:cNvSpPr>
-          <p:nvPr>
-            <p:ph idx="1"/>
-          </p:nvPr>
-        </p:nvSpPr>
-        <p:spPr/>
-        <p:txBody>
-          <a:bodyPr/>
-          <a:lstStyle/>
-          <a:p>
-            <a:r>
-              <a:rPr lang="en-US"/>
-              <a:t>A:</a:t>
-            </a:r>
-          </a:p>
-          <a:p>
-            <a:pPr marL="274320" lvl="1" indent="0">
-              <a:buNone/>
-            </a:pPr>
-            <a:r>
-              <a:rPr lang="en-US"/>
-              <a:t>CLS1_ParseWithCommandTable()</a:t>
-            </a:r>
-          </a:p>
-          <a:p>
-            <a:pPr marL="274320" lvl="1" indent="0">
-              <a:buNone/>
-            </a:pPr>
-            <a:endParaRPr lang="en-US"/>
-          </a:p>
-          <a:p>
-            <a:pPr marL="274320" lvl="1" indent="0">
-              <a:buNone/>
-            </a:pPr>
-            <a:r>
-              <a:rPr lang="en-US"/>
-              <a:t>Übernimmt direkt einen String als Parameter, kein Auslesen der Konsolen-Eingabe, kein Buffer notwendig, nicht im for-loop des ShellTasks</a:t>
-            </a:r>
-          </a:p>
-          <a:p>
-            <a:pPr marL="274320" lvl="1" indent="0">
-              <a:buNone/>
-            </a:pPr>
-            <a:endParaRPr lang="en-US"/>
-          </a:p>
-          <a:p>
-            <a:pPr marL="274320" lvl="1" indent="0">
-              <a:buNone/>
-            </a:pPr>
-            <a:endParaRPr lang="en-US"/>
-          </a:p>
-          <a:p>
-            <a:pPr marL="274320" lvl="1" indent="0">
-              <a:buNone/>
-            </a:pPr>
-            <a:endParaRPr lang="en-US"/>
-          </a:p>
-        </p:txBody>
-      </p:sp>
-    </p:spTree>
-    <p:extLst>
-      <p:ext uri="{BB962C8B-B14F-4D97-AF65-F5344CB8AC3E}">
-        <p14:creationId xmlns:p14="http://schemas.microsoft.com/office/powerpoint/2010/main" val="3033504430"/>
-      </p:ext>
-    </p:extLst>
-  </p:cSld>
-  <p:clrMapOvr>
-    <a:masterClrMapping/>
-  </p:clrMapOvr>
-</p:sld>
-</file>
-
 <file path=ppt/slides/slide18.xml><?xml version="1.0" encoding="utf-8"?>
 <p:sld xmlns:a="http://schemas.openxmlformats.org/drawingml/2006/main" xmlns:r="http://schemas.openxmlformats.org/officeDocument/2006/relationships" xmlns:p="http://schemas.openxmlformats.org/presentationml/2006/main">
   <p:cSld>
@@ -5027,54 +4696,429 @@
               <a:rPr lang="en-US" dirty="0"/>
               <a:t>Quiz Shell</a:t>
             </a:r>
+          </a:p>
+        </p:txBody>
+      </p:sp>
+      <p:sp>
+        <p:nvSpPr>
+          <p:cNvPr id="3" name="Inhaltsplatzhalter 2"/>
+          <p:cNvSpPr>
+            <a:spLocks noGrp="1"/>
+          </p:cNvSpPr>
+          <p:nvPr>
+            <p:ph idx="1"/>
+          </p:nvPr>
+        </p:nvSpPr>
+        <p:spPr/>
+        <p:txBody>
+          <a:bodyPr>
+            <a:normAutofit lnSpcReduction="10000"/>
+          </a:bodyPr>
+          <a:lstStyle/>
+          <a:p>
+            <a:r>
+              <a:rPr lang="en-US" dirty="0"/>
+              <a:t>Q:</a:t>
+            </a:r>
+          </a:p>
+          <a:p>
+            <a:pPr marL="274320" lvl="1" indent="0">
+              <a:buNone/>
+            </a:pPr>
+            <a:r>
+              <a:rPr lang="en-US" dirty="0" err="1"/>
+              <a:t>Obwohl</a:t>
+            </a:r>
+            <a:r>
+              <a:rPr lang="en-US" dirty="0"/>
+              <a:t> Hillary </a:t>
+            </a:r>
+            <a:r>
+              <a:rPr lang="en-US" dirty="0" err="1"/>
+              <a:t>sonst</a:t>
+            </a:r>
+            <a:r>
+              <a:rPr lang="en-US" dirty="0"/>
+              <a:t> </a:t>
+            </a:r>
+            <a:r>
+              <a:rPr lang="en-US" dirty="0" err="1"/>
+              <a:t>nicht</a:t>
+            </a:r>
+            <a:r>
+              <a:rPr lang="en-US" dirty="0"/>
+              <a:t> </a:t>
+            </a:r>
+            <a:r>
+              <a:rPr lang="en-US" dirty="0" err="1"/>
+              <a:t>sehr</a:t>
+            </a:r>
+            <a:r>
+              <a:rPr lang="en-US" dirty="0"/>
+              <a:t> IT-</a:t>
+            </a:r>
+            <a:r>
+              <a:rPr lang="en-US" dirty="0" err="1"/>
+              <a:t>begabt</a:t>
+            </a:r>
+            <a:r>
+              <a:rPr lang="en-US" dirty="0"/>
+              <a:t> </a:t>
+            </a:r>
+            <a:r>
+              <a:rPr lang="en-US" dirty="0" err="1"/>
+              <a:t>ist</a:t>
+            </a:r>
+            <a:r>
+              <a:rPr lang="en-US" dirty="0"/>
+              <a:t>, hat </a:t>
+            </a:r>
+            <a:r>
+              <a:rPr lang="en-US" dirty="0" err="1"/>
+              <a:t>sie</a:t>
+            </a:r>
+            <a:r>
+              <a:rPr lang="en-US" dirty="0"/>
+              <a:t> </a:t>
+            </a:r>
+            <a:r>
+              <a:rPr lang="en-US" dirty="0" err="1"/>
+              <a:t>es</a:t>
+            </a:r>
+            <a:r>
+              <a:rPr lang="en-US" dirty="0"/>
+              <a:t> </a:t>
+            </a:r>
+            <a:r>
+              <a:rPr lang="en-US" dirty="0" err="1"/>
+              <a:t>geschafft</a:t>
+            </a:r>
+            <a:r>
+              <a:rPr lang="en-US" dirty="0"/>
+              <a:t> </a:t>
+            </a:r>
+            <a:r>
+              <a:rPr lang="en-US" dirty="0" err="1"/>
+              <a:t>ihren</a:t>
+            </a:r>
+            <a:r>
+              <a:rPr lang="en-US" dirty="0"/>
+              <a:t> Shell-Parser so </a:t>
+            </a:r>
+            <a:r>
+              <a:rPr lang="en-US" dirty="0" err="1"/>
+              <a:t>zu</a:t>
+            </a:r>
+            <a:r>
+              <a:rPr lang="en-US" dirty="0"/>
+              <a:t> </a:t>
+            </a:r>
+            <a:r>
+              <a:rPr lang="en-US" dirty="0" err="1"/>
+              <a:t>erweitern</a:t>
+            </a:r>
+            <a:r>
+              <a:rPr lang="en-US" dirty="0"/>
+              <a:t>, </a:t>
+            </a:r>
+            <a:r>
+              <a:rPr lang="en-US" dirty="0" err="1"/>
+              <a:t>dass</a:t>
+            </a:r>
+            <a:r>
+              <a:rPr lang="en-US" dirty="0"/>
+              <a:t> die </a:t>
+            </a:r>
+            <a:r>
+              <a:rPr lang="en-US" dirty="0" err="1"/>
+              <a:t>Eingabe</a:t>
+            </a:r>
+            <a:r>
+              <a:rPr lang="en-US" dirty="0"/>
+              <a:t> von “result” </a:t>
+            </a:r>
+            <a:r>
+              <a:rPr lang="en-US" dirty="0" err="1"/>
+              <a:t>zur</a:t>
+            </a:r>
+            <a:r>
+              <a:rPr lang="en-US" dirty="0"/>
+              <a:t> </a:t>
+            </a:r>
+            <a:r>
+              <a:rPr lang="en-US" dirty="0" err="1"/>
+              <a:t>Ausgabe</a:t>
+            </a:r>
+            <a:r>
+              <a:rPr lang="en-US" dirty="0"/>
+              <a:t> des Strings “disappointing” </a:t>
+            </a:r>
+            <a:r>
+              <a:rPr lang="en-US" dirty="0" err="1"/>
+              <a:t>führt</a:t>
+            </a:r>
+            <a:r>
+              <a:rPr lang="en-US" dirty="0"/>
+              <a:t>. Nun </a:t>
+            </a:r>
+            <a:r>
+              <a:rPr lang="en-US" dirty="0" err="1"/>
+              <a:t>möchte</a:t>
+            </a:r>
+            <a:r>
+              <a:rPr lang="en-US" dirty="0"/>
+              <a:t> </a:t>
+            </a:r>
+            <a:r>
+              <a:rPr lang="en-US" dirty="0" err="1"/>
+              <a:t>sie</a:t>
+            </a:r>
+            <a:r>
+              <a:rPr lang="en-US" dirty="0"/>
+              <a:t> die </a:t>
+            </a:r>
+            <a:r>
+              <a:rPr lang="en-US" dirty="0" err="1"/>
+              <a:t>Ausgabe</a:t>
+            </a:r>
+            <a:r>
+              <a:rPr lang="en-US" dirty="0"/>
+              <a:t> </a:t>
+            </a:r>
+            <a:r>
+              <a:rPr lang="en-US" dirty="0" err="1"/>
+              <a:t>als</a:t>
+            </a:r>
+            <a:r>
+              <a:rPr lang="en-US" dirty="0"/>
+              <a:t> </a:t>
+            </a:r>
+            <a:r>
+              <a:rPr lang="en-US" dirty="0" err="1"/>
+              <a:t>automatische</a:t>
+            </a:r>
+            <a:r>
+              <a:rPr lang="en-US" dirty="0"/>
+              <a:t> </a:t>
+            </a:r>
+            <a:r>
+              <a:rPr lang="en-US" dirty="0" err="1"/>
+              <a:t>Willkommensnachricht</a:t>
+            </a:r>
+            <a:r>
+              <a:rPr lang="en-US" dirty="0"/>
+              <a:t> </a:t>
+            </a:r>
+            <a:r>
+              <a:rPr lang="en-US" dirty="0" err="1"/>
+              <a:t>bei</a:t>
+            </a:r>
+            <a:r>
+              <a:rPr lang="en-US" dirty="0"/>
+              <a:t> </a:t>
+            </a:r>
+            <a:r>
+              <a:rPr lang="en-US" dirty="0" err="1"/>
+              <a:t>jedem</a:t>
+            </a:r>
+            <a:r>
+              <a:rPr lang="en-US" dirty="0"/>
+              <a:t> </a:t>
+            </a:r>
+            <a:r>
+              <a:rPr lang="en-US" dirty="0" err="1"/>
+              <a:t>Systemstart</a:t>
+            </a:r>
+            <a:r>
+              <a:rPr lang="en-US" dirty="0"/>
+              <a:t> </a:t>
+            </a:r>
+            <a:r>
+              <a:rPr lang="en-US" dirty="0" err="1"/>
+              <a:t>zu</a:t>
+            </a:r>
+            <a:r>
+              <a:rPr lang="en-US" dirty="0"/>
+              <a:t> </a:t>
+            </a:r>
+            <a:r>
+              <a:rPr lang="en-US" dirty="0" err="1"/>
+              <a:t>sehen</a:t>
+            </a:r>
+            <a:r>
+              <a:rPr lang="en-US" dirty="0"/>
+              <a:t> </a:t>
+            </a:r>
+            <a:r>
+              <a:rPr lang="en-US" dirty="0" err="1"/>
+              <a:t>bekommen</a:t>
+            </a:r>
+            <a:r>
+              <a:rPr lang="en-US" dirty="0"/>
+              <a:t>.</a:t>
+            </a:r>
+          </a:p>
+          <a:p>
+            <a:pPr marL="274320" lvl="1" indent="0">
+              <a:buNone/>
+            </a:pPr>
+            <a:r>
+              <a:rPr lang="en-US" dirty="0" err="1"/>
+              <a:t>Welche</a:t>
+            </a:r>
+            <a:r>
+              <a:rPr lang="en-US" dirty="0"/>
+              <a:t> der </a:t>
+            </a:r>
+            <a:r>
+              <a:rPr lang="en-US" dirty="0" err="1"/>
+              <a:t>beiden</a:t>
+            </a:r>
+            <a:r>
+              <a:rPr lang="en-US" dirty="0"/>
+              <a:t> </a:t>
+            </a:r>
+            <a:r>
+              <a:rPr lang="en-US" dirty="0" err="1"/>
+              <a:t>folgenden</a:t>
+            </a:r>
+            <a:r>
+              <a:rPr lang="en-US" dirty="0"/>
+              <a:t> </a:t>
+            </a:r>
+            <a:r>
+              <a:rPr lang="en-US" dirty="0" err="1"/>
+              <a:t>Funktionen</a:t>
+            </a:r>
+            <a:r>
+              <a:rPr lang="en-US" dirty="0"/>
+              <a:t> </a:t>
+            </a:r>
+            <a:r>
+              <a:rPr lang="en-US" dirty="0" err="1"/>
+              <a:t>setzt</a:t>
+            </a:r>
+            <a:r>
+              <a:rPr lang="en-US" dirty="0"/>
+              <a:t> </a:t>
+            </a:r>
+            <a:r>
+              <a:rPr lang="en-US" dirty="0" err="1"/>
+              <a:t>sie</a:t>
+            </a:r>
+            <a:r>
+              <a:rPr lang="en-US" dirty="0"/>
+              <a:t> </a:t>
+            </a:r>
+            <a:r>
+              <a:rPr lang="en-US" dirty="0" err="1"/>
+              <a:t>dafür</a:t>
+            </a:r>
+            <a:r>
+              <a:rPr lang="en-US" dirty="0"/>
+              <a:t> </a:t>
+            </a:r>
+            <a:r>
+              <a:rPr lang="en-US" dirty="0" err="1"/>
+              <a:t>im</a:t>
+            </a:r>
+            <a:r>
+              <a:rPr lang="en-US" dirty="0"/>
+              <a:t> </a:t>
+            </a:r>
+            <a:r>
+              <a:rPr lang="en-US" dirty="0" err="1"/>
+              <a:t>ShellTask</a:t>
+            </a:r>
+            <a:r>
+              <a:rPr lang="en-US" dirty="0"/>
+              <a:t> </a:t>
+            </a:r>
+            <a:r>
+              <a:rPr lang="en-US" dirty="0" err="1"/>
+              <a:t>ein</a:t>
+            </a:r>
+            <a:r>
+              <a:rPr lang="en-US" dirty="0"/>
+              <a:t> und </a:t>
+            </a:r>
+            <a:r>
+              <a:rPr lang="en-US" dirty="0" err="1"/>
+              <a:t>warum</a:t>
+            </a:r>
+            <a:r>
+              <a:rPr lang="en-US" dirty="0"/>
+              <a:t>?</a:t>
+            </a:r>
+          </a:p>
+          <a:p>
+            <a:pPr marL="274320" lvl="1" indent="0">
+              <a:buNone/>
+            </a:pPr>
+            <a:endParaRPr lang="en-US" dirty="0"/>
+          </a:p>
+          <a:p>
+            <a:pPr marL="274320" lvl="1" indent="0">
+              <a:buNone/>
+            </a:pPr>
+            <a:r>
+              <a:rPr lang="en-US" dirty="0"/>
+              <a:t>CLS1_ParseWithCommandTable()</a:t>
+            </a:r>
+          </a:p>
+          <a:p>
+            <a:pPr marL="274320" lvl="1" indent="0">
+              <a:buNone/>
+            </a:pPr>
+            <a:endParaRPr lang="en-US" dirty="0"/>
+          </a:p>
+          <a:p>
+            <a:pPr marL="274320" lvl="1" indent="0">
+              <a:buNone/>
+            </a:pPr>
             <a:r>
               <a:rPr lang="en-US" dirty="0"/>
               <a:t>	</a:t>
             </a:r>
-          </a:p>
-        </p:txBody>
-      </p:sp>
-      <p:sp>
-        <p:nvSpPr>
-          <p:cNvPr id="3" name="Inhaltsplatzhalter 2"/>
-          <p:cNvSpPr>
-            <a:spLocks noGrp="1"/>
-          </p:cNvSpPr>
-          <p:nvPr>
-            <p:ph idx="1"/>
-          </p:nvPr>
-        </p:nvSpPr>
-        <p:spPr/>
-        <p:txBody>
-          <a:bodyPr/>
-          <a:lstStyle/>
-          <a:p>
-            <a:r>
-              <a:rPr lang="en-US"/>
-              <a:t>Q: </a:t>
-            </a:r>
+            <a:r>
+              <a:rPr lang="en-US" dirty="0" err="1"/>
+              <a:t>oder</a:t>
+            </a:r>
+            <a:endParaRPr lang="en-US" dirty="0"/>
           </a:p>
           <a:p>
             <a:pPr marL="274320" lvl="1" indent="0">
               <a:buNone/>
             </a:pPr>
-            <a:r>
-              <a:rPr lang="en-US"/>
-              <a:t>Was ist der Unterschied zwischen den Funktionen UTIL1_strcmp() und UTIL1_strncmp() ?</a:t>
-            </a:r>
-          </a:p>
-          <a:p>
-            <a:pPr marL="0" indent="0">
+            <a:endParaRPr lang="en-US" dirty="0"/>
+          </a:p>
+          <a:p>
+            <a:pPr marL="274320" lvl="1" indent="0">
               <a:buNone/>
             </a:pPr>
-            <a:endParaRPr lang="en-US"/>
+            <a:r>
+              <a:rPr lang="en-US" dirty="0"/>
+              <a:t>CLS1_ReadAndParseWithCommandTable()</a:t>
+            </a:r>
+          </a:p>
+          <a:p>
+            <a:pPr marL="274320" lvl="1" indent="0">
+              <a:buNone/>
+            </a:pPr>
+            <a:endParaRPr lang="en-US" dirty="0"/>
+          </a:p>
+          <a:p>
+            <a:pPr marL="274320" lvl="1" indent="0">
+              <a:buNone/>
+            </a:pPr>
+            <a:endParaRPr lang="en-US" dirty="0"/>
           </a:p>
         </p:txBody>
       </p:sp>
     </p:spTree>
     <p:extLst>
       <p:ext uri="{BB962C8B-B14F-4D97-AF65-F5344CB8AC3E}">
-        <p14:creationId xmlns:p14="http://schemas.microsoft.com/office/powerpoint/2010/main" val="3805281602"/>
+        <p14:creationId xmlns:p14="http://schemas.microsoft.com/office/powerpoint/2010/main" val="1890198303"/>
       </p:ext>
     </p:extLst>
   </p:cSld>
@@ -5120,10 +5164,6 @@
               <a:rPr lang="en-US" dirty="0"/>
               <a:t>Quiz Shell</a:t>
             </a:r>
-            <a:r>
-              <a:rPr lang="en-US" dirty="0"/>
-              <a:t>	</a:t>
-            </a:r>
           </a:p>
         </p:txBody>
       </p:sp>
@@ -5144,7 +5184,7 @@
           <a:p>
             <a:r>
               <a:rPr lang="en-US"/>
-              <a:t>Q: </a:t>
+              <a:t>A:</a:t>
             </a:r>
           </a:p>
           <a:p>
@@ -5153,41 +5193,48 @@
             </a:pPr>
             <a:r>
               <a:rPr lang="en-US"/>
-              <a:t>Was ist der Unterschied zwischen den Funktionen UTIL1_strcmp() und UTIL1_strncmp() ?</a:t>
-            </a:r>
-          </a:p>
-          <a:p>
+              <a:t>CLS1_ParseWithCommandTable()</a:t>
+            </a:r>
+          </a:p>
+          <a:p>
+            <a:pPr marL="274320" lvl="1" indent="0">
+              <a:buNone/>
+            </a:pPr>
             <a:endParaRPr lang="en-US"/>
           </a:p>
           <a:p>
-            <a:r>
-              <a:rPr lang="en-US"/>
-              <a:t>A: </a:t>
-            </a:r>
-          </a:p>
-          <a:p>
             <a:pPr marL="274320" lvl="1" indent="0">
               <a:buNone/>
             </a:pPr>
             <a:r>
               <a:rPr lang="en-US"/>
-              <a:t>UTIL1_str</a:t>
-            </a:r>
-            <a:r>
-              <a:rPr lang="en-US" b="1"/>
-              <a:t>n</a:t>
-            </a:r>
-            <a:r>
-              <a:rPr lang="en-US"/>
-              <a:t>cmp() hat zusätzlich zu den zwei Strings ein size Parameter, der angibt bis zu welcher Position verglichen werden soll.</a:t>
-            </a:r>
+              <a:t>Kein Auslesen der Konsolen-Eingabe, kein Buffer notwendig, nicht im for-loop des ShellTasks.</a:t>
+            </a:r>
+          </a:p>
+          <a:p>
+            <a:pPr marL="274320" lvl="1" indent="0">
+              <a:buNone/>
+            </a:pPr>
+            <a:endParaRPr lang="en-US"/>
+          </a:p>
+          <a:p>
+            <a:pPr marL="274320" lvl="1" indent="0">
+              <a:buNone/>
+            </a:pPr>
+            <a:endParaRPr lang="en-US"/>
+          </a:p>
+          <a:p>
+            <a:pPr marL="274320" lvl="1" indent="0">
+              <a:buNone/>
+            </a:pPr>
+            <a:endParaRPr lang="en-US"/>
           </a:p>
         </p:txBody>
       </p:sp>
     </p:spTree>
     <p:extLst>
       <p:ext uri="{BB962C8B-B14F-4D97-AF65-F5344CB8AC3E}">
-        <p14:creationId xmlns:p14="http://schemas.microsoft.com/office/powerpoint/2010/main" val="429199765"/>
+        <p14:creationId xmlns:p14="http://schemas.microsoft.com/office/powerpoint/2010/main" val="3033504430"/>
       </p:ext>
     </p:extLst>
   </p:cSld>
@@ -5291,6 +5338,204 @@
     <p:extLst>
       <p:ext uri="{BB962C8B-B14F-4D97-AF65-F5344CB8AC3E}">
         <p14:creationId xmlns:p14="http://schemas.microsoft.com/office/powerpoint/2010/main" val="190575833"/>
+      </p:ext>
+    </p:extLst>
+  </p:cSld>
+  <p:clrMapOvr>
+    <a:masterClrMapping/>
+  </p:clrMapOvr>
+</p:sld>
+</file>
+
+<file path=ppt/slides/slide20.xml><?xml version="1.0" encoding="utf-8"?>
+<p:sld xmlns:a="http://schemas.openxmlformats.org/drawingml/2006/main" xmlns:r="http://schemas.openxmlformats.org/officeDocument/2006/relationships" xmlns:p="http://schemas.openxmlformats.org/presentationml/2006/main">
+  <p:cSld>
+    <p:spTree>
+      <p:nvGrpSpPr>
+        <p:cNvPr id="1" name=""/>
+        <p:cNvGrpSpPr/>
+        <p:nvPr/>
+      </p:nvGrpSpPr>
+      <p:grpSpPr>
+        <a:xfrm>
+          <a:off x="0" y="0"/>
+          <a:ext cx="0" cy="0"/>
+          <a:chOff x="0" y="0"/>
+          <a:chExt cx="0" cy="0"/>
+        </a:xfrm>
+      </p:grpSpPr>
+      <p:sp>
+        <p:nvSpPr>
+          <p:cNvPr id="2" name="Titel 1"/>
+          <p:cNvSpPr>
+            <a:spLocks noGrp="1"/>
+          </p:cNvSpPr>
+          <p:nvPr>
+            <p:ph type="title"/>
+          </p:nvPr>
+        </p:nvSpPr>
+        <p:spPr/>
+        <p:txBody>
+          <a:bodyPr/>
+          <a:lstStyle/>
+          <a:p>
+            <a:r>
+              <a:rPr lang="en-US" dirty="0"/>
+              <a:t>Quiz Shell	</a:t>
+            </a:r>
+          </a:p>
+        </p:txBody>
+      </p:sp>
+      <p:sp>
+        <p:nvSpPr>
+          <p:cNvPr id="3" name="Inhaltsplatzhalter 2"/>
+          <p:cNvSpPr>
+            <a:spLocks noGrp="1"/>
+          </p:cNvSpPr>
+          <p:nvPr>
+            <p:ph idx="1"/>
+          </p:nvPr>
+        </p:nvSpPr>
+        <p:spPr/>
+        <p:txBody>
+          <a:bodyPr/>
+          <a:lstStyle/>
+          <a:p>
+            <a:r>
+              <a:rPr lang="en-US"/>
+              <a:t>Q: </a:t>
+            </a:r>
+          </a:p>
+          <a:p>
+            <a:pPr marL="274320" lvl="1" indent="0">
+              <a:buNone/>
+            </a:pPr>
+            <a:r>
+              <a:rPr lang="en-US"/>
+              <a:t>Was ist der Unterschied zwischen den Funktionen UTIL1_strcmp() und UTIL1_strncmp() ?</a:t>
+            </a:r>
+          </a:p>
+          <a:p>
+            <a:pPr marL="0" indent="0">
+              <a:buNone/>
+            </a:pPr>
+            <a:endParaRPr lang="en-US"/>
+          </a:p>
+        </p:txBody>
+      </p:sp>
+    </p:spTree>
+    <p:extLst>
+      <p:ext uri="{BB962C8B-B14F-4D97-AF65-F5344CB8AC3E}">
+        <p14:creationId xmlns:p14="http://schemas.microsoft.com/office/powerpoint/2010/main" val="3805281602"/>
+      </p:ext>
+    </p:extLst>
+  </p:cSld>
+  <p:clrMapOvr>
+    <a:masterClrMapping/>
+  </p:clrMapOvr>
+</p:sld>
+</file>
+
+<file path=ppt/slides/slide21.xml><?xml version="1.0" encoding="utf-8"?>
+<p:sld xmlns:a="http://schemas.openxmlformats.org/drawingml/2006/main" xmlns:r="http://schemas.openxmlformats.org/officeDocument/2006/relationships" xmlns:p="http://schemas.openxmlformats.org/presentationml/2006/main">
+  <p:cSld>
+    <p:spTree>
+      <p:nvGrpSpPr>
+        <p:cNvPr id="1" name=""/>
+        <p:cNvGrpSpPr/>
+        <p:nvPr/>
+      </p:nvGrpSpPr>
+      <p:grpSpPr>
+        <a:xfrm>
+          <a:off x="0" y="0"/>
+          <a:ext cx="0" cy="0"/>
+          <a:chOff x="0" y="0"/>
+          <a:chExt cx="0" cy="0"/>
+        </a:xfrm>
+      </p:grpSpPr>
+      <p:sp>
+        <p:nvSpPr>
+          <p:cNvPr id="2" name="Titel 1"/>
+          <p:cNvSpPr>
+            <a:spLocks noGrp="1"/>
+          </p:cNvSpPr>
+          <p:nvPr>
+            <p:ph type="title"/>
+          </p:nvPr>
+        </p:nvSpPr>
+        <p:spPr/>
+        <p:txBody>
+          <a:bodyPr/>
+          <a:lstStyle/>
+          <a:p>
+            <a:r>
+              <a:rPr lang="en-US" dirty="0"/>
+              <a:t>Quiz Shell	</a:t>
+            </a:r>
+          </a:p>
+        </p:txBody>
+      </p:sp>
+      <p:sp>
+        <p:nvSpPr>
+          <p:cNvPr id="3" name="Inhaltsplatzhalter 2"/>
+          <p:cNvSpPr>
+            <a:spLocks noGrp="1"/>
+          </p:cNvSpPr>
+          <p:nvPr>
+            <p:ph idx="1"/>
+          </p:nvPr>
+        </p:nvSpPr>
+        <p:spPr/>
+        <p:txBody>
+          <a:bodyPr/>
+          <a:lstStyle/>
+          <a:p>
+            <a:r>
+              <a:rPr lang="en-US"/>
+              <a:t>Q: </a:t>
+            </a:r>
+          </a:p>
+          <a:p>
+            <a:pPr marL="274320" lvl="1" indent="0">
+              <a:buNone/>
+            </a:pPr>
+            <a:r>
+              <a:rPr lang="en-US"/>
+              <a:t>Was ist der Unterschied zwischen den Funktionen UTIL1_strcmp() und UTIL1_strncmp() ?</a:t>
+            </a:r>
+          </a:p>
+          <a:p>
+            <a:endParaRPr lang="en-US"/>
+          </a:p>
+          <a:p>
+            <a:r>
+              <a:rPr lang="en-US"/>
+              <a:t>A: </a:t>
+            </a:r>
+          </a:p>
+          <a:p>
+            <a:pPr marL="274320" lvl="1" indent="0">
+              <a:buNone/>
+            </a:pPr>
+            <a:r>
+              <a:rPr lang="en-US"/>
+              <a:t>UTIL1_str</a:t>
+            </a:r>
+            <a:r>
+              <a:rPr lang="en-US" b="1"/>
+              <a:t>n</a:t>
+            </a:r>
+            <a:r>
+              <a:rPr lang="en-US"/>
+              <a:t>cmp() hat zusätzlich zu den zwei Strings ein size Parameter, der angibt bis zu welcher Position verglichen werden soll.</a:t>
+            </a:r>
+          </a:p>
+        </p:txBody>
+      </p:sp>
+    </p:spTree>
+    <p:extLst>
+      <p:ext uri="{BB962C8B-B14F-4D97-AF65-F5344CB8AC3E}">
+        <p14:creationId xmlns:p14="http://schemas.microsoft.com/office/powerpoint/2010/main" val="429199765"/>
       </p:ext>
     </p:extLst>
   </p:cSld>
@@ -5347,7 +5592,7 @@
             <a:avLst/>
           </a:prstGeom>
           <a:extLst>
-            <a:ext uri="{909E8E84-426E-40DD-AFC4-6F175D3DCCD1}">
+            <a:ext uri="{909E8E84-426E-40dd-AFC4-6F175D3DCCD1}">
               <a14:hiddenFill xmlns:a14="http://schemas.microsoft.com/office/drawing/2010/main">
                 <a:solidFill>
                   <a:srgbClr val="FFFFFF"/>

</xml_diff>